<commit_message>
add github link to ppt
將github的連結加入到ppt中
</commit_message>
<xml_diff>
--- a/淺談時序資料分析.pptx
+++ b/淺談時序資料分析.pptx
@@ -12660,8 +12660,8 @@
           </a:p>
         </p:txBody>
       </p:sp>
-      <mc:AlternateContent xmlns:mc="http://schemas.openxmlformats.org/markup-compatibility/2006">
-        <mc:Choice xmlns:a14="http://schemas.microsoft.com/office/drawing/2010/main" Requires="a14">
+      <mc:AlternateContent xmlns:mc="http://schemas.openxmlformats.org/markup-compatibility/2006" xmlns:a14="http://schemas.microsoft.com/office/drawing/2010/main">
+        <mc:Choice Requires="a14">
           <p:sp>
             <p:nvSpPr>
               <p:cNvPr id="3" name="內容版面配置區 2"/>
@@ -13120,7 +13120,7 @@
             </p:txBody>
           </p:sp>
         </mc:Choice>
-        <mc:Fallback>
+        <mc:Fallback xmlns="">
           <p:sp>
             <p:nvSpPr>
               <p:cNvPr id="3" name="內容版面配置區 2"/>
@@ -15413,14 +15413,12 @@
           <a:p>
             <a:r>
               <a:rPr lang="zh-TW" altLang="en-US" dirty="0" smtClean="0"/>
-              <a:t>相關範例程式碼可以</a:t>
-            </a:r>
-            <a:r>
-              <a:rPr lang="zh-TW" altLang="en-US" dirty="0" smtClean="0"/>
-              <a:t>於我的</a:t>
-            </a:r>
-            <a:r>
-              <a:rPr lang="en-US" altLang="zh-TW" dirty="0" err="1" smtClean="0"/>
+              <a:t>相關範例程式碼可以於我的</a:t>
+            </a:r>
+            <a:r>
+              <a:rPr lang="en-US" altLang="zh-TW" dirty="0" err="1" smtClean="0">
+                <a:hlinkClick r:id="rId3"/>
+              </a:rPr>
               <a:t>Github</a:t>
             </a:r>
             <a:r>
@@ -16581,7 +16579,6 @@
               <a:rPr lang="en-US" altLang="zh-TW" dirty="0" smtClean="0"/>
               <a:t>Math</a:t>
             </a:r>
-            <a:endParaRPr lang="en-US" altLang="zh-TW" dirty="0" smtClean="0"/>
           </a:p>
         </p:txBody>
       </p:sp>

</xml_diff>